<commit_message>
Alterando a apresentacao1: Fadding Led
</commit_message>
<xml_diff>
--- a/Apresentação/Arquitetura de Computadores1.pptx
+++ b/Apresentação/Arquitetura de Computadores1.pptx
@@ -5,18 +5,21 @@
     <p:sldMasterId id="2147483648" r:id="rId1"/>
   </p:sldMasterIdLst>
   <p:notesMasterIdLst>
-    <p:notesMasterId r:id="rId12"/>
+    <p:notesMasterId r:id="rId14"/>
   </p:notesMasterIdLst>
   <p:sldIdLst>
-    <p:sldId id="256" r:id="rId3"/>
-    <p:sldId id="257" r:id="rId4"/>
+    <p:sldId id="256" r:id="rId2"/>
+    <p:sldId id="257" r:id="rId3"/>
+    <p:sldId id="265" r:id="rId4"/>
     <p:sldId id="258" r:id="rId5"/>
     <p:sldId id="259" r:id="rId6"/>
     <p:sldId id="260" r:id="rId7"/>
     <p:sldId id="261" r:id="rId8"/>
     <p:sldId id="262" r:id="rId9"/>
-    <p:sldId id="263" r:id="rId10"/>
-    <p:sldId id="264" r:id="rId11"/>
+    <p:sldId id="266" r:id="rId10"/>
+    <p:sldId id="267" r:id="rId11"/>
+    <p:sldId id="263" r:id="rId12"/>
+    <p:sldId id="264" r:id="rId13"/>
   </p:sldIdLst>
   <p:sldSz cx="12192000" cy="6858000"/>
   <p:notesSz cx="6858000" cy="9144000"/>
@@ -115,6 +118,14 @@
       </a:defRPr>
     </a:lvl9pPr>
   </p:defaultTextStyle>
+  <p:extLst>
+    <p:ext uri="{EFAFB233-063F-42B5-8137-9DF3F51BA10A}">
+      <p15:sldGuideLst xmlns:p15="http://schemas.microsoft.com/office/powerpoint/2012/main"/>
+    </p:ext>
+    <p:ext uri="{2D200454-40CA-4A62-9FC3-DE9A4176ACB9}">
+      <p15:notesGuideLst xmlns:p15="http://schemas.microsoft.com/office/powerpoint/2012/main"/>
+    </p:ext>
+  </p:extLst>
 </p:presentation>
 </file>
 
@@ -200,6 +211,7 @@
           <a:p>
             <a:fld id="{6C70B395-2DD1-4E0C-AD7F-C33E717CE14B}" type="datetimeFigureOut">
               <a:rPr lang="pt-BR" smtClean="0"/>
+              <a:t>09/03/2017</a:t>
             </a:fld>
             <a:endParaRPr lang="pt-BR"/>
           </a:p>
@@ -266,7 +278,6 @@
               <a:rPr lang="pt-BR" smtClean="0"/>
               <a:t>Editar estilos de texto Mestre</a:t>
             </a:r>
-            <a:endParaRPr lang="pt-BR" smtClean="0"/>
           </a:p>
           <a:p>
             <a:pPr lvl="1"/>
@@ -274,7 +285,6 @@
               <a:rPr lang="pt-BR" smtClean="0"/>
               <a:t>Segundo nível</a:t>
             </a:r>
-            <a:endParaRPr lang="pt-BR" smtClean="0"/>
           </a:p>
           <a:p>
             <a:pPr lvl="2"/>
@@ -282,7 +292,6 @@
               <a:rPr lang="pt-BR" smtClean="0"/>
               <a:t>Terceiro nível</a:t>
             </a:r>
-            <a:endParaRPr lang="pt-BR" smtClean="0"/>
           </a:p>
           <a:p>
             <a:pPr lvl="3"/>
@@ -290,7 +299,6 @@
               <a:rPr lang="pt-BR" smtClean="0"/>
               <a:t>Quarto nível</a:t>
             </a:r>
-            <a:endParaRPr lang="pt-BR" smtClean="0"/>
           </a:p>
           <a:p>
             <a:pPr lvl="4"/>
@@ -362,12 +370,18 @@
           <a:p>
             <a:fld id="{A6666332-D461-43D9-A1C1-8FF0295CCEC5}" type="slidenum">
               <a:rPr lang="pt-BR" smtClean="0"/>
+              <a:t>‹nº›</a:t>
             </a:fld>
             <a:endParaRPr lang="pt-BR"/>
           </a:p>
         </p:txBody>
       </p:sp>
     </p:spTree>
+    <p:extLst>
+      <p:ext uri="{BB962C8B-B14F-4D97-AF65-F5344CB8AC3E}">
+        <p14:creationId xmlns:p14="http://schemas.microsoft.com/office/powerpoint/2010/main" val="4103845790"/>
+      </p:ext>
+    </p:extLst>
   </p:cSld>
   <p:clrMap bg1="lt1" tx1="dk1" bg2="lt2" tx2="dk2" accent1="accent1" accent2="accent2" accent3="accent3" accent4="accent4" accent5="accent5" accent6="accent6" hlink="hlink" folHlink="folHlink"/>
   <p:notesStyle>
@@ -596,6 +610,7 @@
           <a:p>
             <a:fld id="{AC89BC54-1CDC-4473-9720-F58E1E464D2A}" type="datetimeFigureOut">
               <a:rPr lang="pt-BR" smtClean="0"/>
+              <a:t>09/03/2017</a:t>
             </a:fld>
             <a:endParaRPr lang="pt-BR"/>
           </a:p>
@@ -637,6 +652,7 @@
           <a:p>
             <a:fld id="{E3682030-28A4-485C-A222-4952DDFF562A}" type="slidenum">
               <a:rPr lang="pt-BR" smtClean="0"/>
+              <a:t>‹nº›</a:t>
             </a:fld>
             <a:endParaRPr lang="pt-BR"/>
           </a:p>
@@ -693,7 +709,6 @@
               <a:rPr lang="pt-BR" smtClean="0"/>
               <a:t>Editar estilos de texto Mestre</a:t>
             </a:r>
-            <a:endParaRPr lang="pt-BR" smtClean="0"/>
           </a:p>
           <a:p>
             <a:pPr lvl="1"/>
@@ -701,7 +716,6 @@
               <a:rPr lang="pt-BR" smtClean="0"/>
               <a:t>Segundo nível</a:t>
             </a:r>
-            <a:endParaRPr lang="pt-BR" smtClean="0"/>
           </a:p>
           <a:p>
             <a:pPr lvl="2"/>
@@ -709,7 +723,6 @@
               <a:rPr lang="pt-BR" smtClean="0"/>
               <a:t>Terceiro nível</a:t>
             </a:r>
-            <a:endParaRPr lang="pt-BR" smtClean="0"/>
           </a:p>
           <a:p>
             <a:pPr lvl="3"/>
@@ -717,7 +730,6 @@
               <a:rPr lang="pt-BR" smtClean="0"/>
               <a:t>Quarto nível</a:t>
             </a:r>
-            <a:endParaRPr lang="pt-BR" smtClean="0"/>
           </a:p>
           <a:p>
             <a:pPr lvl="4"/>
@@ -746,6 +758,7 @@
           <a:p>
             <a:fld id="{AC89BC54-1CDC-4473-9720-F58E1E464D2A}" type="datetimeFigureOut">
               <a:rPr lang="pt-BR" smtClean="0"/>
+              <a:t>09/03/2017</a:t>
             </a:fld>
             <a:endParaRPr lang="pt-BR"/>
           </a:p>
@@ -787,6 +800,7 @@
           <a:p>
             <a:fld id="{E3682030-28A4-485C-A222-4952DDFF562A}" type="slidenum">
               <a:rPr lang="pt-BR" smtClean="0"/>
+              <a:t>‹nº›</a:t>
             </a:fld>
             <a:endParaRPr lang="pt-BR"/>
           </a:p>
@@ -861,7 +875,6 @@
               <a:rPr lang="pt-BR" smtClean="0"/>
               <a:t>Editar estilos de texto Mestre</a:t>
             </a:r>
-            <a:endParaRPr lang="pt-BR" smtClean="0"/>
           </a:p>
           <a:p>
             <a:pPr lvl="1"/>
@@ -869,7 +882,6 @@
               <a:rPr lang="pt-BR" smtClean="0"/>
               <a:t>Segundo nível</a:t>
             </a:r>
-            <a:endParaRPr lang="pt-BR" smtClean="0"/>
           </a:p>
           <a:p>
             <a:pPr lvl="2"/>
@@ -877,7 +889,6 @@
               <a:rPr lang="pt-BR" smtClean="0"/>
               <a:t>Terceiro nível</a:t>
             </a:r>
-            <a:endParaRPr lang="pt-BR" smtClean="0"/>
           </a:p>
           <a:p>
             <a:pPr lvl="3"/>
@@ -885,7 +896,6 @@
               <a:rPr lang="pt-BR" smtClean="0"/>
               <a:t>Quarto nível</a:t>
             </a:r>
-            <a:endParaRPr lang="pt-BR" smtClean="0"/>
           </a:p>
           <a:p>
             <a:pPr lvl="4"/>
@@ -914,6 +924,7 @@
           <a:p>
             <a:fld id="{AC89BC54-1CDC-4473-9720-F58E1E464D2A}" type="datetimeFigureOut">
               <a:rPr lang="pt-BR" smtClean="0"/>
+              <a:t>09/03/2017</a:t>
             </a:fld>
             <a:endParaRPr lang="pt-BR"/>
           </a:p>
@@ -955,6 +966,7 @@
           <a:p>
             <a:fld id="{E3682030-28A4-485C-A222-4952DDFF562A}" type="slidenum">
               <a:rPr lang="pt-BR" smtClean="0"/>
+              <a:t>‹nº›</a:t>
             </a:fld>
             <a:endParaRPr lang="pt-BR"/>
           </a:p>
@@ -1134,7 +1146,6 @@
               <a:rPr lang="pt-BR" smtClean="0"/>
               <a:t>Editar estilos de texto Mestre</a:t>
             </a:r>
-            <a:endParaRPr lang="pt-BR" smtClean="0"/>
           </a:p>
         </p:txBody>
       </p:sp>
@@ -1155,6 +1166,7 @@
           <a:p>
             <a:fld id="{AC89BC54-1CDC-4473-9720-F58E1E464D2A}" type="datetimeFigureOut">
               <a:rPr lang="pt-BR" smtClean="0"/>
+              <a:t>09/03/2017</a:t>
             </a:fld>
             <a:endParaRPr lang="pt-BR"/>
           </a:p>
@@ -1196,6 +1208,7 @@
           <a:p>
             <a:fld id="{E3682030-28A4-485C-A222-4952DDFF562A}" type="slidenum">
               <a:rPr lang="pt-BR" smtClean="0"/>
+              <a:t>‹nº›</a:t>
             </a:fld>
             <a:endParaRPr lang="pt-BR"/>
           </a:p>
@@ -1275,7 +1288,6 @@
               <a:rPr lang="pt-BR" smtClean="0"/>
               <a:t>Editar estilos de texto Mestre</a:t>
             </a:r>
-            <a:endParaRPr lang="pt-BR" smtClean="0"/>
           </a:p>
           <a:p>
             <a:pPr lvl="1"/>
@@ -1283,7 +1295,6 @@
               <a:rPr lang="pt-BR" smtClean="0"/>
               <a:t>Segundo nível</a:t>
             </a:r>
-            <a:endParaRPr lang="pt-BR" smtClean="0"/>
           </a:p>
           <a:p>
             <a:pPr lvl="2"/>
@@ -1291,7 +1302,6 @@
               <a:rPr lang="pt-BR" smtClean="0"/>
               <a:t>Terceiro nível</a:t>
             </a:r>
-            <a:endParaRPr lang="pt-BR" smtClean="0"/>
           </a:p>
           <a:p>
             <a:pPr lvl="3"/>
@@ -1299,7 +1309,6 @@
               <a:rPr lang="pt-BR" smtClean="0"/>
               <a:t>Quarto nível</a:t>
             </a:r>
-            <a:endParaRPr lang="pt-BR" smtClean="0"/>
           </a:p>
           <a:p>
             <a:pPr lvl="4"/>
@@ -1336,7 +1345,6 @@
               <a:rPr lang="pt-BR" smtClean="0"/>
               <a:t>Editar estilos de texto Mestre</a:t>
             </a:r>
-            <a:endParaRPr lang="pt-BR" smtClean="0"/>
           </a:p>
           <a:p>
             <a:pPr lvl="1"/>
@@ -1344,7 +1352,6 @@
               <a:rPr lang="pt-BR" smtClean="0"/>
               <a:t>Segundo nível</a:t>
             </a:r>
-            <a:endParaRPr lang="pt-BR" smtClean="0"/>
           </a:p>
           <a:p>
             <a:pPr lvl="2"/>
@@ -1352,7 +1359,6 @@
               <a:rPr lang="pt-BR" smtClean="0"/>
               <a:t>Terceiro nível</a:t>
             </a:r>
-            <a:endParaRPr lang="pt-BR" smtClean="0"/>
           </a:p>
           <a:p>
             <a:pPr lvl="3"/>
@@ -1360,7 +1366,6 @@
               <a:rPr lang="pt-BR" smtClean="0"/>
               <a:t>Quarto nível</a:t>
             </a:r>
-            <a:endParaRPr lang="pt-BR" smtClean="0"/>
           </a:p>
           <a:p>
             <a:pPr lvl="4"/>
@@ -1389,6 +1394,7 @@
           <a:p>
             <a:fld id="{AC89BC54-1CDC-4473-9720-F58E1E464D2A}" type="datetimeFigureOut">
               <a:rPr lang="pt-BR" smtClean="0"/>
+              <a:t>09/03/2017</a:t>
             </a:fld>
             <a:endParaRPr lang="pt-BR"/>
           </a:p>
@@ -1430,6 +1436,7 @@
           <a:p>
             <a:fld id="{E3682030-28A4-485C-A222-4952DDFF562A}" type="slidenum">
               <a:rPr lang="pt-BR" smtClean="0"/>
+              <a:t>‹nº›</a:t>
             </a:fld>
             <a:endParaRPr lang="pt-BR"/>
           </a:p>
@@ -1551,7 +1558,6 @@
               <a:rPr lang="pt-BR" smtClean="0"/>
               <a:t>Editar estilos de texto Mestre</a:t>
             </a:r>
-            <a:endParaRPr lang="pt-BR" smtClean="0"/>
           </a:p>
         </p:txBody>
       </p:sp>
@@ -1580,7 +1586,6 @@
               <a:rPr lang="pt-BR" smtClean="0"/>
               <a:t>Editar estilos de texto Mestre</a:t>
             </a:r>
-            <a:endParaRPr lang="pt-BR" smtClean="0"/>
           </a:p>
           <a:p>
             <a:pPr lvl="1"/>
@@ -1588,7 +1593,6 @@
               <a:rPr lang="pt-BR" smtClean="0"/>
               <a:t>Segundo nível</a:t>
             </a:r>
-            <a:endParaRPr lang="pt-BR" smtClean="0"/>
           </a:p>
           <a:p>
             <a:pPr lvl="2"/>
@@ -1596,7 +1600,6 @@
               <a:rPr lang="pt-BR" smtClean="0"/>
               <a:t>Terceiro nível</a:t>
             </a:r>
-            <a:endParaRPr lang="pt-BR" smtClean="0"/>
           </a:p>
           <a:p>
             <a:pPr lvl="3"/>
@@ -1604,7 +1607,6 @@
               <a:rPr lang="pt-BR" smtClean="0"/>
               <a:t>Quarto nível</a:t>
             </a:r>
-            <a:endParaRPr lang="pt-BR" smtClean="0"/>
           </a:p>
           <a:p>
             <a:pPr lvl="4"/>
@@ -1678,7 +1680,6 @@
               <a:rPr lang="pt-BR" smtClean="0"/>
               <a:t>Editar estilos de texto Mestre</a:t>
             </a:r>
-            <a:endParaRPr lang="pt-BR" smtClean="0"/>
           </a:p>
         </p:txBody>
       </p:sp>
@@ -1707,7 +1708,6 @@
               <a:rPr lang="pt-BR" smtClean="0"/>
               <a:t>Editar estilos de texto Mestre</a:t>
             </a:r>
-            <a:endParaRPr lang="pt-BR" smtClean="0"/>
           </a:p>
           <a:p>
             <a:pPr lvl="1"/>
@@ -1715,7 +1715,6 @@
               <a:rPr lang="pt-BR" smtClean="0"/>
               <a:t>Segundo nível</a:t>
             </a:r>
-            <a:endParaRPr lang="pt-BR" smtClean="0"/>
           </a:p>
           <a:p>
             <a:pPr lvl="2"/>
@@ -1723,7 +1722,6 @@
               <a:rPr lang="pt-BR" smtClean="0"/>
               <a:t>Terceiro nível</a:t>
             </a:r>
-            <a:endParaRPr lang="pt-BR" smtClean="0"/>
           </a:p>
           <a:p>
             <a:pPr lvl="3"/>
@@ -1731,7 +1729,6 @@
               <a:rPr lang="pt-BR" smtClean="0"/>
               <a:t>Quarto nível</a:t>
             </a:r>
-            <a:endParaRPr lang="pt-BR" smtClean="0"/>
           </a:p>
           <a:p>
             <a:pPr lvl="4"/>
@@ -1760,6 +1757,7 @@
           <a:p>
             <a:fld id="{AC89BC54-1CDC-4473-9720-F58E1E464D2A}" type="datetimeFigureOut">
               <a:rPr lang="pt-BR" smtClean="0"/>
+              <a:t>09/03/2017</a:t>
             </a:fld>
             <a:endParaRPr lang="pt-BR"/>
           </a:p>
@@ -1801,6 +1799,7 @@
           <a:p>
             <a:fld id="{E3682030-28A4-485C-A222-4952DDFF562A}" type="slidenum">
               <a:rPr lang="pt-BR" smtClean="0"/>
+              <a:t>‹nº›</a:t>
             </a:fld>
             <a:endParaRPr lang="pt-BR"/>
           </a:p>
@@ -1872,6 +1871,7 @@
           <a:p>
             <a:fld id="{AC89BC54-1CDC-4473-9720-F58E1E464D2A}" type="datetimeFigureOut">
               <a:rPr lang="pt-BR" smtClean="0"/>
+              <a:t>09/03/2017</a:t>
             </a:fld>
             <a:endParaRPr lang="pt-BR"/>
           </a:p>
@@ -1913,6 +1913,7 @@
           <a:p>
             <a:fld id="{E3682030-28A4-485C-A222-4952DDFF562A}" type="slidenum">
               <a:rPr lang="pt-BR" smtClean="0"/>
+              <a:t>‹nº›</a:t>
             </a:fld>
             <a:endParaRPr lang="pt-BR"/>
           </a:p>
@@ -1961,6 +1962,7 @@
           <a:p>
             <a:fld id="{AC89BC54-1CDC-4473-9720-F58E1E464D2A}" type="datetimeFigureOut">
               <a:rPr lang="pt-BR" smtClean="0"/>
+              <a:t>09/03/2017</a:t>
             </a:fld>
             <a:endParaRPr lang="pt-BR"/>
           </a:p>
@@ -2002,6 +2004,7 @@
           <a:p>
             <a:fld id="{E3682030-28A4-485C-A222-4952DDFF562A}" type="slidenum">
               <a:rPr lang="pt-BR" smtClean="0"/>
+              <a:t>‹nº›</a:t>
             </a:fld>
             <a:endParaRPr lang="pt-BR"/>
           </a:p>
@@ -2188,7 +2191,6 @@
               <a:rPr lang="pt-BR" smtClean="0"/>
               <a:t>Editar estilos de texto Mestre</a:t>
             </a:r>
-            <a:endParaRPr lang="pt-BR" smtClean="0"/>
           </a:p>
         </p:txBody>
       </p:sp>
@@ -2209,6 +2211,7 @@
           <a:p>
             <a:fld id="{AC89BC54-1CDC-4473-9720-F58E1E464D2A}" type="datetimeFigureOut">
               <a:rPr lang="pt-BR" smtClean="0"/>
+              <a:t>09/03/2017</a:t>
             </a:fld>
             <a:endParaRPr lang="pt-BR"/>
           </a:p>
@@ -2250,6 +2253,7 @@
           <a:p>
             <a:fld id="{E3682030-28A4-485C-A222-4952DDFF562A}" type="slidenum">
               <a:rPr lang="pt-BR" smtClean="0"/>
+              <a:t>‹nº›</a:t>
             </a:fld>
             <a:endParaRPr lang="pt-BR"/>
           </a:p>
@@ -2334,7 +2338,6 @@
               <a:rPr lang="pt-BR" smtClean="0"/>
               <a:t>Editar estilos de texto Mestre</a:t>
             </a:r>
-            <a:endParaRPr lang="pt-BR" smtClean="0"/>
           </a:p>
           <a:p>
             <a:pPr lvl="1"/>
@@ -2342,7 +2345,6 @@
               <a:rPr lang="pt-BR" smtClean="0"/>
               <a:t>Segundo nível</a:t>
             </a:r>
-            <a:endParaRPr lang="pt-BR" smtClean="0"/>
           </a:p>
           <a:p>
             <a:pPr lvl="2"/>
@@ -2350,7 +2352,6 @@
               <a:rPr lang="pt-BR" smtClean="0"/>
               <a:t>Terceiro nível</a:t>
             </a:r>
-            <a:endParaRPr lang="pt-BR" smtClean="0"/>
           </a:p>
           <a:p>
             <a:pPr lvl="3"/>
@@ -2358,7 +2359,6 @@
               <a:rPr lang="pt-BR" smtClean="0"/>
               <a:t>Quarto nível</a:t>
             </a:r>
-            <a:endParaRPr lang="pt-BR" smtClean="0"/>
           </a:p>
           <a:p>
             <a:pPr lvl="4"/>
@@ -2387,6 +2387,7 @@
           <a:p>
             <a:fld id="{AC89BC54-1CDC-4473-9720-F58E1E464D2A}" type="datetimeFigureOut">
               <a:rPr lang="pt-BR" smtClean="0"/>
+              <a:t>09/03/2017</a:t>
             </a:fld>
             <a:endParaRPr lang="pt-BR"/>
           </a:p>
@@ -2428,6 +2429,7 @@
           <a:p>
             <a:fld id="{E3682030-28A4-485C-A222-4952DDFF562A}" type="slidenum">
               <a:rPr lang="pt-BR" smtClean="0"/>
+              <a:t>‹nº›</a:t>
             </a:fld>
             <a:endParaRPr lang="pt-BR"/>
           </a:p>
@@ -2527,7 +2529,6 @@
               <a:rPr lang="pt-BR" smtClean="0"/>
               <a:t>Editar estilos de texto Mestre</a:t>
             </a:r>
-            <a:endParaRPr lang="pt-BR" smtClean="0"/>
           </a:p>
           <a:p>
             <a:pPr lvl="1"/>
@@ -2535,7 +2536,6 @@
               <a:rPr lang="pt-BR" smtClean="0"/>
               <a:t>Segundo nível</a:t>
             </a:r>
-            <a:endParaRPr lang="pt-BR" smtClean="0"/>
           </a:p>
           <a:p>
             <a:pPr lvl="2"/>
@@ -2543,7 +2543,6 @@
               <a:rPr lang="pt-BR" smtClean="0"/>
               <a:t>Terceiro nível</a:t>
             </a:r>
-            <a:endParaRPr lang="pt-BR" smtClean="0"/>
           </a:p>
           <a:p>
             <a:pPr lvl="3"/>
@@ -2551,7 +2550,6 @@
               <a:rPr lang="pt-BR" smtClean="0"/>
               <a:t>Quarto nível</a:t>
             </a:r>
-            <a:endParaRPr lang="pt-BR" smtClean="0"/>
           </a:p>
           <a:p>
             <a:pPr lvl="4"/>
@@ -2598,6 +2596,7 @@
           <a:p>
             <a:fld id="{AC89BC54-1CDC-4473-9720-F58E1E464D2A}" type="datetimeFigureOut">
               <a:rPr lang="pt-BR" smtClean="0"/>
+              <a:t>09/03/2017</a:t>
             </a:fld>
             <a:endParaRPr lang="pt-BR"/>
           </a:p>
@@ -2675,6 +2674,7 @@
           <a:p>
             <a:fld id="{E3682030-28A4-485C-A222-4952DDFF562A}" type="slidenum">
               <a:rPr lang="pt-BR" smtClean="0"/>
+              <a:t>‹nº›</a:t>
             </a:fld>
             <a:endParaRPr lang="pt-BR"/>
           </a:p>
@@ -2988,7 +2988,14 @@
         <p:cNvGrpSpPr/>
         <p:nvPr/>
       </p:nvGrpSpPr>
-      <p:grpSpPr/>
+      <p:grpSpPr>
+        <a:xfrm>
+          <a:off x="0" y="0"/>
+          <a:ext cx="0" cy="0"/>
+          <a:chOff x="0" y="0"/>
+          <a:chExt cx="0" cy="0"/>
+        </a:xfrm>
+      </p:grpSpPr>
       <p:sp>
         <p:nvSpPr>
           <p:cNvPr id="2" name="Título 1"/>
@@ -3007,17 +3014,39 @@
         </p:spPr>
         <p:txBody>
           <a:bodyPr/>
-          <a:p>
-            <a:r>
-              <a:rPr lang="pt-BR" altLang="en-US" sz="4400">
+          <a:lstStyle/>
+          <a:p>
+            <a:r>
+              <a:rPr lang="pt-BR" altLang="en-US" sz="4400" dirty="0">
                 <a:solidFill>
                   <a:schemeClr val="tx1"/>
                 </a:solidFill>
                 <a:uFillTx/>
               </a:rPr>
-              <a:t>Arquitetura de Computadores</a:t>
-            </a:r>
-            <a:endParaRPr lang="pt-BR" altLang="en-US" sz="4400">
+              <a:t>Arquitetura de </a:t>
+            </a:r>
+            <a:r>
+              <a:rPr lang="pt-BR" altLang="en-US" sz="4400" dirty="0" smtClean="0">
+                <a:solidFill>
+                  <a:schemeClr val="tx1"/>
+                </a:solidFill>
+                <a:uFillTx/>
+              </a:rPr>
+              <a:t>Computadores</a:t>
+            </a:r>
+            <a:br>
+              <a:rPr lang="pt-BR" altLang="en-US" sz="4400" dirty="0" smtClean="0">
+                <a:solidFill>
+                  <a:schemeClr val="tx1"/>
+                </a:solidFill>
+                <a:uFillTx/>
+              </a:rPr>
+            </a:br>
+            <a:r>
+              <a:rPr lang="pt-BR" altLang="en-US" sz="4400" dirty="0" smtClean="0"/>
+              <a:t>Fading Led (PWM)</a:t>
+            </a:r>
+            <a:endParaRPr lang="pt-BR" altLang="en-US" sz="4400" dirty="0">
               <a:solidFill>
                 <a:schemeClr val="tx1"/>
               </a:solidFill>
@@ -3044,26 +3073,24 @@
         </p:spPr>
         <p:txBody>
           <a:bodyPr/>
+          <a:lstStyle/>
           <a:p>
             <a:r>
               <a:rPr lang="pt-BR" altLang="en-US"/>
               <a:t>Pablo Silva</a:t>
             </a:r>
-            <a:endParaRPr lang="pt-BR" altLang="en-US"/>
           </a:p>
           <a:p>
             <a:r>
               <a:rPr lang="pt-BR" altLang="en-US"/>
               <a:t>Marco Túlio</a:t>
             </a:r>
-            <a:endParaRPr lang="pt-BR" altLang="en-US"/>
           </a:p>
           <a:p>
             <a:r>
               <a:rPr lang="pt-BR" altLang="en-US"/>
               <a:t>Vitor do Vale</a:t>
             </a:r>
-            <a:endParaRPr lang="pt-BR" altLang="en-US"/>
           </a:p>
         </p:txBody>
       </p:sp>
@@ -3080,9 +3107,322 @@
         <p:spPr/>
         <p:txBody>
           <a:bodyPr/>
+          <a:lstStyle/>
           <a:p>
             <a:fld id="{E3682030-28A4-485C-A222-4952DDFF562A}" type="slidenum">
               <a:rPr lang="pt-BR" smtClean="0"/>
+              <a:t>1</a:t>
+            </a:fld>
+            <a:endParaRPr lang="pt-BR"/>
+          </a:p>
+        </p:txBody>
+      </p:sp>
+    </p:spTree>
+  </p:cSld>
+  <p:clrMapOvr>
+    <a:masterClrMapping/>
+  </p:clrMapOvr>
+</p:sld>
+</file>
+
+<file path=ppt/slides/slide10.xml><?xml version="1.0" encoding="utf-8"?>
+<p:sld xmlns:a="http://schemas.openxmlformats.org/drawingml/2006/main" xmlns:r="http://schemas.openxmlformats.org/officeDocument/2006/relationships" xmlns:p="http://schemas.openxmlformats.org/presentationml/2006/main">
+  <p:cSld>
+    <p:spTree>
+      <p:nvGrpSpPr>
+        <p:cNvPr id="1" name=""/>
+        <p:cNvGrpSpPr/>
+        <p:nvPr/>
+      </p:nvGrpSpPr>
+      <p:grpSpPr>
+        <a:xfrm>
+          <a:off x="0" y="0"/>
+          <a:ext cx="0" cy="0"/>
+          <a:chOff x="0" y="0"/>
+          <a:chExt cx="0" cy="0"/>
+        </a:xfrm>
+      </p:grpSpPr>
+      <p:sp>
+        <p:nvSpPr>
+          <p:cNvPr id="2" name="Título 1"/>
+          <p:cNvSpPr>
+            <a:spLocks noGrp="1"/>
+          </p:cNvSpPr>
+          <p:nvPr>
+            <p:ph type="title"/>
+          </p:nvPr>
+        </p:nvSpPr>
+        <p:spPr/>
+        <p:txBody>
+          <a:bodyPr/>
+          <a:lstStyle/>
+          <a:p>
+            <a:r>
+              <a:rPr lang="pt-BR" dirty="0" smtClean="0"/>
+              <a:t>Registradores: </a:t>
+            </a:r>
+            <a:r>
+              <a:rPr lang="pt-BR" dirty="0"/>
+              <a:t>OCR1A </a:t>
+            </a:r>
+            <a:endParaRPr lang="pt-BR" dirty="0"/>
+          </a:p>
+        </p:txBody>
+      </p:sp>
+      <p:sp>
+        <p:nvSpPr>
+          <p:cNvPr id="3" name="Espaço Reservado para Conteúdo 2"/>
+          <p:cNvSpPr>
+            <a:spLocks noGrp="1"/>
+          </p:cNvSpPr>
+          <p:nvPr>
+            <p:ph idx="1"/>
+          </p:nvPr>
+        </p:nvSpPr>
+        <p:spPr/>
+        <p:txBody>
+          <a:bodyPr/>
+          <a:lstStyle/>
+          <a:p>
+            <a:r>
+              <a:rPr lang="pt-BR" dirty="0" smtClean="0"/>
+              <a:t>Conforme o OCR1A recebe os valores retornados pelo potenciômetro.</a:t>
+            </a:r>
+          </a:p>
+          <a:p>
+            <a:endParaRPr lang="pt-BR" dirty="0"/>
+          </a:p>
+          <a:p>
+            <a:r>
+              <a:rPr lang="pt-BR" dirty="0" smtClean="0"/>
+              <a:t>Conforme os valor de OCR1A fica recebendo os valores retornados pelo potenciômetro, alteramos o tempo a frequência que geramos interrupções na nossa saída PWM.</a:t>
+            </a:r>
+            <a:endParaRPr lang="pt-BR" dirty="0"/>
+          </a:p>
+        </p:txBody>
+      </p:sp>
+      <p:sp>
+        <p:nvSpPr>
+          <p:cNvPr id="4" name="Espaço Reservado para Número de Slide 3"/>
+          <p:cNvSpPr>
+            <a:spLocks noGrp="1"/>
+          </p:cNvSpPr>
+          <p:nvPr>
+            <p:ph type="sldNum" sz="quarter" idx="12"/>
+          </p:nvPr>
+        </p:nvSpPr>
+        <p:spPr/>
+        <p:txBody>
+          <a:bodyPr/>
+          <a:lstStyle/>
+          <a:p>
+            <a:fld id="{E3682030-28A4-485C-A222-4952DDFF562A}" type="slidenum">
+              <a:rPr lang="pt-BR" smtClean="0"/>
+              <a:t>10</a:t>
+            </a:fld>
+            <a:endParaRPr lang="pt-BR"/>
+          </a:p>
+        </p:txBody>
+      </p:sp>
+    </p:spTree>
+    <p:extLst>
+      <p:ext uri="{BB962C8B-B14F-4D97-AF65-F5344CB8AC3E}">
+        <p14:creationId xmlns:p14="http://schemas.microsoft.com/office/powerpoint/2010/main" val="271961056"/>
+      </p:ext>
+    </p:extLst>
+  </p:cSld>
+  <p:clrMapOvr>
+    <a:masterClrMapping/>
+  </p:clrMapOvr>
+</p:sld>
+</file>
+
+<file path=ppt/slides/slide11.xml><?xml version="1.0" encoding="utf-8"?>
+<p:sld xmlns:a="http://schemas.openxmlformats.org/drawingml/2006/main" xmlns:r="http://schemas.openxmlformats.org/officeDocument/2006/relationships" xmlns:p="http://schemas.openxmlformats.org/presentationml/2006/main">
+  <p:cSld>
+    <p:spTree>
+      <p:nvGrpSpPr>
+        <p:cNvPr id="1" name=""/>
+        <p:cNvGrpSpPr/>
+        <p:nvPr/>
+      </p:nvGrpSpPr>
+      <p:grpSpPr>
+        <a:xfrm>
+          <a:off x="0" y="0"/>
+          <a:ext cx="0" cy="0"/>
+          <a:chOff x="0" y="0"/>
+          <a:chExt cx="0" cy="0"/>
+        </a:xfrm>
+      </p:grpSpPr>
+      <p:sp>
+        <p:nvSpPr>
+          <p:cNvPr id="2" name="Título 1"/>
+          <p:cNvSpPr>
+            <a:spLocks noGrp="1"/>
+          </p:cNvSpPr>
+          <p:nvPr>
+            <p:ph type="title"/>
+          </p:nvPr>
+        </p:nvSpPr>
+        <p:spPr/>
+        <p:txBody>
+          <a:bodyPr/>
+          <a:lstStyle/>
+          <a:p>
+            <a:r>
+              <a:rPr lang="pt-BR" altLang="en-US"/>
+              <a:t>Montagem protoboard: PWM </a:t>
+            </a:r>
+          </a:p>
+        </p:txBody>
+      </p:sp>
+      <p:pic>
+        <p:nvPicPr>
+          <p:cNvPr id="4" name="Espaço Reservado para Conteúdo 3" descr="Fading_LED_Fritzing_bb"/>
+          <p:cNvPicPr>
+            <a:picLocks noGrp="1" noChangeAspect="1"/>
+          </p:cNvPicPr>
+          <p:nvPr>
+            <p:ph idx="1"/>
+          </p:nvPr>
+        </p:nvPicPr>
+        <p:blipFill>
+          <a:blip r:embed="rId2"/>
+          <a:stretch>
+            <a:fillRect/>
+          </a:stretch>
+        </p:blipFill>
+        <p:spPr>
+          <a:xfrm>
+            <a:off x="1534160" y="1979930"/>
+            <a:ext cx="9124315" cy="3764280"/>
+          </a:xfrm>
+          <a:prstGeom prst="rect">
+            <a:avLst/>
+          </a:prstGeom>
+        </p:spPr>
+      </p:pic>
+      <p:sp>
+        <p:nvSpPr>
+          <p:cNvPr id="3" name="Espaço Reservado para Número de Slide 2"/>
+          <p:cNvSpPr>
+            <a:spLocks noGrp="1"/>
+          </p:cNvSpPr>
+          <p:nvPr>
+            <p:ph type="sldNum" sz="quarter" idx="12"/>
+          </p:nvPr>
+        </p:nvSpPr>
+        <p:spPr/>
+        <p:txBody>
+          <a:bodyPr/>
+          <a:lstStyle/>
+          <a:p>
+            <a:fld id="{E3682030-28A4-485C-A222-4952DDFF562A}" type="slidenum">
+              <a:rPr lang="pt-BR" smtClean="0"/>
+              <a:t>11</a:t>
+            </a:fld>
+            <a:endParaRPr lang="pt-BR"/>
+          </a:p>
+        </p:txBody>
+      </p:sp>
+    </p:spTree>
+  </p:cSld>
+  <p:clrMapOvr>
+    <a:masterClrMapping/>
+  </p:clrMapOvr>
+  <p:timing>
+    <p:tnLst>
+      <p:par>
+        <p:cTn id="1" dur="indefinite" restart="never" nodeType="tmRoot"/>
+      </p:par>
+    </p:tnLst>
+  </p:timing>
+</p:sld>
+</file>
+
+<file path=ppt/slides/slide12.xml><?xml version="1.0" encoding="utf-8"?>
+<p:sld xmlns:a="http://schemas.openxmlformats.org/drawingml/2006/main" xmlns:r="http://schemas.openxmlformats.org/officeDocument/2006/relationships" xmlns:p="http://schemas.openxmlformats.org/presentationml/2006/main">
+  <p:cSld>
+    <p:spTree>
+      <p:nvGrpSpPr>
+        <p:cNvPr id="1" name=""/>
+        <p:cNvGrpSpPr/>
+        <p:nvPr/>
+      </p:nvGrpSpPr>
+      <p:grpSpPr>
+        <a:xfrm>
+          <a:off x="0" y="0"/>
+          <a:ext cx="0" cy="0"/>
+          <a:chOff x="0" y="0"/>
+          <a:chExt cx="0" cy="0"/>
+        </a:xfrm>
+      </p:grpSpPr>
+      <p:sp>
+        <p:nvSpPr>
+          <p:cNvPr id="2" name="Título 1"/>
+          <p:cNvSpPr>
+            <a:spLocks noGrp="1"/>
+          </p:cNvSpPr>
+          <p:nvPr>
+            <p:ph type="title"/>
+          </p:nvPr>
+        </p:nvSpPr>
+        <p:spPr/>
+        <p:txBody>
+          <a:bodyPr/>
+          <a:lstStyle/>
+          <a:p>
+            <a:r>
+              <a:rPr lang="pt-BR" altLang="en-US"/>
+              <a:t>Esquemático: Projeto PWM</a:t>
+            </a:r>
+          </a:p>
+        </p:txBody>
+      </p:sp>
+      <p:pic>
+        <p:nvPicPr>
+          <p:cNvPr id="5" name="Espaço Reservado para Conteúdo 4" descr="Fading_LED_Fritzing_Esquemático"/>
+          <p:cNvPicPr>
+            <a:picLocks noGrp="1" noChangeAspect="1"/>
+          </p:cNvPicPr>
+          <p:nvPr>
+            <p:ph idx="1"/>
+          </p:nvPr>
+        </p:nvPicPr>
+        <p:blipFill>
+          <a:blip r:embed="rId2"/>
+          <a:stretch>
+            <a:fillRect/>
+          </a:stretch>
+        </p:blipFill>
+        <p:spPr>
+          <a:xfrm>
+            <a:off x="1143635" y="1239520"/>
+            <a:ext cx="9242425" cy="5601335"/>
+          </a:xfrm>
+          <a:prstGeom prst="rect">
+            <a:avLst/>
+          </a:prstGeom>
+        </p:spPr>
+      </p:pic>
+      <p:sp>
+        <p:nvSpPr>
+          <p:cNvPr id="3" name="Espaço Reservado para Número de Slide 2"/>
+          <p:cNvSpPr>
+            <a:spLocks noGrp="1"/>
+          </p:cNvSpPr>
+          <p:nvPr>
+            <p:ph type="sldNum" sz="quarter" idx="12"/>
+          </p:nvPr>
+        </p:nvSpPr>
+        <p:spPr/>
+        <p:txBody>
+          <a:bodyPr/>
+          <a:lstStyle/>
+          <a:p>
+            <a:fld id="{E3682030-28A4-485C-A222-4952DDFF562A}" type="slidenum">
+              <a:rPr lang="pt-BR" smtClean="0"/>
+              <a:t>12</a:t>
             </a:fld>
             <a:endParaRPr lang="pt-BR"/>
           </a:p>
@@ -3105,7 +3445,14 @@
         <p:cNvGrpSpPr/>
         <p:nvPr/>
       </p:nvGrpSpPr>
-      <p:grpSpPr/>
+      <p:grpSpPr>
+        <a:xfrm>
+          <a:off x="0" y="0"/>
+          <a:ext cx="0" cy="0"/>
+          <a:chOff x="0" y="0"/>
+          <a:chExt cx="0" cy="0"/>
+        </a:xfrm>
+      </p:grpSpPr>
       <p:sp>
         <p:nvSpPr>
           <p:cNvPr id="2" name="Título 1"/>
@@ -3119,12 +3466,12 @@
         <p:spPr/>
         <p:txBody>
           <a:bodyPr/>
+          <a:lstStyle/>
           <a:p>
             <a:r>
               <a:rPr lang="pt-BR" altLang="en-US"/>
               <a:t>O que é PWM?</a:t>
             </a:r>
-            <a:endParaRPr lang="pt-BR" altLang="en-US"/>
           </a:p>
         </p:txBody>
       </p:sp>
@@ -3141,6 +3488,7 @@
         <p:spPr/>
         <p:txBody>
           <a:bodyPr/>
+          <a:lstStyle/>
           <a:p>
             <a:pPr marL="0" indent="0" algn="just">
               <a:buNone/>
@@ -3157,7 +3505,6 @@
               <a:rPr lang="pt-BR" altLang="en-US"/>
               <a:t> (PWM) é uma tecnologia que permite controlar a quantidade de energia fornecida a um determinado dispositivo.</a:t>
             </a:r>
-            <a:endParaRPr lang="pt-BR" altLang="en-US"/>
           </a:p>
         </p:txBody>
       </p:sp>
@@ -3174,9 +3521,11 @@
         <p:spPr/>
         <p:txBody>
           <a:bodyPr/>
+          <a:lstStyle/>
           <a:p>
             <a:fld id="{E3682030-28A4-485C-A222-4952DDFF562A}" type="slidenum">
               <a:rPr lang="pt-BR" smtClean="0"/>
+              <a:t>2</a:t>
             </a:fld>
             <a:endParaRPr lang="pt-BR"/>
           </a:p>
@@ -3199,7 +3548,14 @@
         <p:cNvGrpSpPr/>
         <p:nvPr/>
       </p:nvGrpSpPr>
-      <p:grpSpPr/>
+      <p:grpSpPr>
+        <a:xfrm>
+          <a:off x="0" y="0"/>
+          <a:ext cx="0" cy="0"/>
+          <a:chOff x="0" y="0"/>
+          <a:chExt cx="0" cy="0"/>
+        </a:xfrm>
+      </p:grpSpPr>
       <p:sp>
         <p:nvSpPr>
           <p:cNvPr id="2" name="Título 1"/>
@@ -3213,59 +3569,36 @@
         <p:spPr/>
         <p:txBody>
           <a:bodyPr/>
-          <a:p>
-            <a:r>
-              <a:rPr lang="pt-BR" altLang="en-US"/>
-              <a:t>PWM</a:t>
-            </a:r>
-            <a:endParaRPr lang="pt-BR" altLang="en-US"/>
-          </a:p>
-        </p:txBody>
-      </p:sp>
-      <p:sp>
-        <p:nvSpPr>
-          <p:cNvPr id="3" name="Espaço Reservado para Conteúdo 2"/>
-          <p:cNvSpPr>
-            <a:spLocks noGrp="1"/>
-          </p:cNvSpPr>
-          <p:nvPr>
-            <p:ph idx="1"/>
-          </p:nvPr>
-        </p:nvSpPr>
-        <p:spPr/>
-        <p:txBody>
-          <a:bodyPr/>
-          <a:p>
-            <a:pPr algn="just"/>
-            <a:r>
-              <a:rPr lang="pt-BR" altLang="en-US"/>
-              <a:t>Para exemplificar, usaremos um exemplo onde temos um circuito formado por um interruptor ação rápida, e uma carga que deve ser controlada de acordo com a figura abaixo:</a:t>
-            </a:r>
-            <a:endParaRPr lang="pt-BR" altLang="en-US"/>
-          </a:p>
-          <a:p>
-            <a:endParaRPr lang="pt-BR" altLang="en-US"/>
+          <a:lstStyle/>
+          <a:p>
+            <a:r>
+              <a:rPr lang="pt-BR" dirty="0" smtClean="0"/>
+              <a:t>Resistor Variável</a:t>
+            </a:r>
+            <a:endParaRPr lang="pt-BR" dirty="0"/>
           </a:p>
         </p:txBody>
       </p:sp>
       <p:pic>
         <p:nvPicPr>
-          <p:cNvPr id="4" name="Imagem 3" descr="mec0071a_03"/>
+          <p:cNvPr id="5" name="Espaço Reservado para Conteúdo 4"/>
           <p:cNvPicPr>
-            <a:picLocks noChangeAspect="1"/>
+            <a:picLocks noGrp="1" noChangeAspect="1"/>
           </p:cNvPicPr>
-          <p:nvPr/>
+          <p:nvPr>
+            <p:ph idx="1"/>
+          </p:nvPr>
         </p:nvPicPr>
         <p:blipFill>
-          <a:blip r:embed="rId1"/>
+          <a:blip r:embed="rId2"/>
           <a:stretch>
             <a:fillRect/>
           </a:stretch>
         </p:blipFill>
         <p:spPr>
           <a:xfrm>
-            <a:off x="2051050" y="3290570"/>
-            <a:ext cx="8232775" cy="2651125"/>
+            <a:off x="490015" y="2537138"/>
+            <a:ext cx="10863785" cy="2395471"/>
           </a:xfrm>
           <a:prstGeom prst="rect">
             <a:avLst/>
@@ -3274,7 +3607,7 @@
       </p:pic>
       <p:sp>
         <p:nvSpPr>
-          <p:cNvPr id="5" name="Espaço Reservado para Número de Slide 4"/>
+          <p:cNvPr id="4" name="Espaço Reservado para Número de Slide 3"/>
           <p:cNvSpPr>
             <a:spLocks noGrp="1"/>
           </p:cNvSpPr>
@@ -3285,15 +3618,22 @@
         <p:spPr/>
         <p:txBody>
           <a:bodyPr/>
+          <a:lstStyle/>
           <a:p>
             <a:fld id="{E3682030-28A4-485C-A222-4952DDFF562A}" type="slidenum">
               <a:rPr lang="pt-BR" smtClean="0"/>
+              <a:t>3</a:t>
             </a:fld>
             <a:endParaRPr lang="pt-BR"/>
           </a:p>
         </p:txBody>
       </p:sp>
     </p:spTree>
+    <p:extLst>
+      <p:ext uri="{BB962C8B-B14F-4D97-AF65-F5344CB8AC3E}">
+        <p14:creationId xmlns:p14="http://schemas.microsoft.com/office/powerpoint/2010/main" val="2103634886"/>
+      </p:ext>
+    </p:extLst>
   </p:cSld>
   <p:clrMapOvr>
     <a:masterClrMapping/>
@@ -3310,7 +3650,14 @@
         <p:cNvGrpSpPr/>
         <p:nvPr/>
       </p:nvGrpSpPr>
-      <p:grpSpPr/>
+      <p:grpSpPr>
+        <a:xfrm>
+          <a:off x="0" y="0"/>
+          <a:ext cx="0" cy="0"/>
+          <a:chOff x="0" y="0"/>
+          <a:chExt cx="0" cy="0"/>
+        </a:xfrm>
+      </p:grpSpPr>
       <p:sp>
         <p:nvSpPr>
           <p:cNvPr id="2" name="Título 1"/>
@@ -3324,55 +3671,68 @@
         <p:spPr/>
         <p:txBody>
           <a:bodyPr/>
+          <a:lstStyle/>
           <a:p>
             <a:r>
               <a:rPr lang="pt-BR" altLang="en-US"/>
               <a:t>PWM</a:t>
             </a:r>
+          </a:p>
+        </p:txBody>
+      </p:sp>
+      <p:sp>
+        <p:nvSpPr>
+          <p:cNvPr id="3" name="Espaço Reservado para Conteúdo 2"/>
+          <p:cNvSpPr>
+            <a:spLocks noGrp="1"/>
+          </p:cNvSpPr>
+          <p:nvPr>
+            <p:ph idx="1"/>
+          </p:nvPr>
+        </p:nvSpPr>
+        <p:spPr/>
+        <p:txBody>
+          <a:bodyPr/>
+          <a:lstStyle/>
+          <a:p>
+            <a:pPr algn="just"/>
+            <a:r>
+              <a:rPr lang="pt-BR" altLang="en-US"/>
+              <a:t>Para exemplificar, usaremos um exemplo onde temos um circuito formado por um interruptor ação rápida, e uma carga que deve ser controlada de acordo com a figura abaixo:</a:t>
+            </a:r>
+          </a:p>
+          <a:p>
             <a:endParaRPr lang="pt-BR" altLang="en-US"/>
           </a:p>
         </p:txBody>
       </p:sp>
-      <p:sp>
-        <p:nvSpPr>
-          <p:cNvPr id="3" name="Espaço Reservado para Conteúdo 2"/>
-          <p:cNvSpPr>
-            <a:spLocks noGrp="1"/>
-          </p:cNvSpPr>
-          <p:nvPr>
-            <p:ph idx="1"/>
-          </p:nvPr>
-        </p:nvSpPr>
-        <p:spPr/>
-        <p:txBody>
-          <a:bodyPr/>
-          <a:p>
-            <a:pPr algn="just"/>
-            <a:r>
-              <a:rPr lang="pt-BR" altLang="en-US"/>
-              <a:t>Quando o interruptor está aberto não há corrente na carga e a potência aplicada é nula. No instante em que o interruptor é fechado, a carga recebe a tensão total da fonte e a potência aplicada é máxima.</a:t>
-            </a:r>
-            <a:endParaRPr lang="pt-BR" altLang="en-US"/>
-          </a:p>
-          <a:p>
-            <a:endParaRPr lang="pt-BR" altLang="en-US"/>
-          </a:p>
-          <a:p>
-            <a:endParaRPr lang="pt-BR" altLang="en-US"/>
-          </a:p>
-          <a:p>
-            <a:pPr algn="just"/>
-            <a:r>
-              <a:rPr lang="pt-BR" altLang="en-US"/>
-              <a:t>E se quisermos usar uma potência intermediaria de 50%, como fazer?</a:t>
-            </a:r>
-            <a:endParaRPr lang="pt-BR" altLang="en-US"/>
-          </a:p>
-        </p:txBody>
-      </p:sp>
-      <p:sp>
-        <p:nvSpPr>
-          <p:cNvPr id="4" name="Espaço Reservado para Número de Slide 3"/>
+      <p:pic>
+        <p:nvPicPr>
+          <p:cNvPr id="4" name="Imagem 3" descr="mec0071a_03"/>
+          <p:cNvPicPr>
+            <a:picLocks noChangeAspect="1"/>
+          </p:cNvPicPr>
+          <p:nvPr/>
+        </p:nvPicPr>
+        <p:blipFill>
+          <a:blip r:embed="rId2"/>
+          <a:stretch>
+            <a:fillRect/>
+          </a:stretch>
+        </p:blipFill>
+        <p:spPr>
+          <a:xfrm>
+            <a:off x="2051050" y="3290570"/>
+            <a:ext cx="8232775" cy="2651125"/>
+          </a:xfrm>
+          <a:prstGeom prst="rect">
+            <a:avLst/>
+          </a:prstGeom>
+        </p:spPr>
+      </p:pic>
+      <p:sp>
+        <p:nvSpPr>
+          <p:cNvPr id="5" name="Espaço Reservado para Número de Slide 4"/>
           <p:cNvSpPr>
             <a:spLocks noGrp="1"/>
           </p:cNvSpPr>
@@ -3383,9 +3743,11 @@
         <p:spPr/>
         <p:txBody>
           <a:bodyPr/>
+          <a:lstStyle/>
           <a:p>
             <a:fld id="{E3682030-28A4-485C-A222-4952DDFF562A}" type="slidenum">
               <a:rPr lang="pt-BR" smtClean="0"/>
+              <a:t>4</a:t>
             </a:fld>
             <a:endParaRPr lang="pt-BR"/>
           </a:p>
@@ -3408,7 +3770,14 @@
         <p:cNvGrpSpPr/>
         <p:nvPr/>
       </p:nvGrpSpPr>
-      <p:grpSpPr/>
+      <p:grpSpPr>
+        <a:xfrm>
+          <a:off x="0" y="0"/>
+          <a:ext cx="0" cy="0"/>
+          <a:chOff x="0" y="0"/>
+          <a:chExt cx="0" cy="0"/>
+        </a:xfrm>
+      </p:grpSpPr>
       <p:sp>
         <p:nvSpPr>
           <p:cNvPr id="2" name="Título 1"/>
@@ -3422,65 +3791,54 @@
         <p:spPr/>
         <p:txBody>
           <a:bodyPr/>
+          <a:lstStyle/>
           <a:p>
             <a:r>
               <a:rPr lang="pt-BR" altLang="en-US"/>
               <a:t>PWM</a:t>
             </a:r>
+          </a:p>
+        </p:txBody>
+      </p:sp>
+      <p:sp>
+        <p:nvSpPr>
+          <p:cNvPr id="3" name="Espaço Reservado para Conteúdo 2"/>
+          <p:cNvSpPr>
+            <a:spLocks noGrp="1"/>
+          </p:cNvSpPr>
+          <p:nvPr>
+            <p:ph idx="1"/>
+          </p:nvPr>
+        </p:nvSpPr>
+        <p:spPr/>
+        <p:txBody>
+          <a:bodyPr/>
+          <a:lstStyle/>
+          <a:p>
+            <a:pPr algn="just"/>
+            <a:r>
+              <a:rPr lang="pt-BR" altLang="en-US"/>
+              <a:t>Quando o interruptor está aberto não há corrente na carga e a potência aplicada é nula. No instante em que o interruptor é fechado, a carga recebe a tensão total da fonte e a potência aplicada é máxima.</a:t>
+            </a:r>
+          </a:p>
+          <a:p>
             <a:endParaRPr lang="pt-BR" altLang="en-US"/>
           </a:p>
-        </p:txBody>
-      </p:sp>
-      <p:sp>
-        <p:nvSpPr>
-          <p:cNvPr id="3" name="Espaço Reservado para Conteúdo 2"/>
-          <p:cNvSpPr>
-            <a:spLocks noGrp="1"/>
-          </p:cNvSpPr>
-          <p:nvPr>
-            <p:ph idx="1"/>
-          </p:nvPr>
-        </p:nvSpPr>
-        <p:spPr/>
-        <p:txBody>
-          <a:bodyPr/>
+          <a:p>
+            <a:endParaRPr lang="pt-BR" altLang="en-US"/>
+          </a:p>
           <a:p>
             <a:pPr algn="just"/>
             <a:r>
               <a:rPr lang="pt-BR" altLang="en-US"/>
-              <a:t>Uma idéia é fazermos com que a chave seja aberta e fechada rapidamente de modo que fique 50% do tempo aberta e 50% fechada. Isso significa que, em média, teremos metade do tempo com corrente e metade do tempo sem corrente.</a:t>
-            </a:r>
-            <a:endParaRPr lang="pt-BR" altLang="en-US"/>
-          </a:p>
-        </p:txBody>
-      </p:sp>
-      <p:pic>
-        <p:nvPicPr>
-          <p:cNvPr id="4" name="Imagem 3" descr="mec0071a_04"/>
-          <p:cNvPicPr>
-            <a:picLocks noChangeAspect="1"/>
-          </p:cNvPicPr>
-          <p:nvPr/>
-        </p:nvPicPr>
-        <p:blipFill>
-          <a:blip r:embed="rId1"/>
-          <a:stretch>
-            <a:fillRect/>
-          </a:stretch>
-        </p:blipFill>
-        <p:spPr>
-          <a:xfrm>
-            <a:off x="838835" y="3585845"/>
-            <a:ext cx="10255250" cy="2946400"/>
-          </a:xfrm>
-          <a:prstGeom prst="rect">
-            <a:avLst/>
-          </a:prstGeom>
-        </p:spPr>
-      </p:pic>
-      <p:sp>
-        <p:nvSpPr>
-          <p:cNvPr id="5" name="Espaço Reservado para Número de Slide 4"/>
+              <a:t>E se quisermos usar uma potência intermediaria de 50%, como fazer?</a:t>
+            </a:r>
+          </a:p>
+        </p:txBody>
+      </p:sp>
+      <p:sp>
+        <p:nvSpPr>
+          <p:cNvPr id="4" name="Espaço Reservado para Número de Slide 3"/>
           <p:cNvSpPr>
             <a:spLocks noGrp="1"/>
           </p:cNvSpPr>
@@ -3491,9 +3849,11 @@
         <p:spPr/>
         <p:txBody>
           <a:bodyPr/>
+          <a:lstStyle/>
           <a:p>
             <a:fld id="{E3682030-28A4-485C-A222-4952DDFF562A}" type="slidenum">
               <a:rPr lang="pt-BR" smtClean="0"/>
+              <a:t>5</a:t>
             </a:fld>
             <a:endParaRPr lang="pt-BR"/>
           </a:p>
@@ -3516,7 +3876,14 @@
         <p:cNvGrpSpPr/>
         <p:nvPr/>
       </p:nvGrpSpPr>
-      <p:grpSpPr/>
+      <p:grpSpPr>
+        <a:xfrm>
+          <a:off x="0" y="0"/>
+          <a:ext cx="0" cy="0"/>
+          <a:chOff x="0" y="0"/>
+          <a:chExt cx="0" cy="0"/>
+        </a:xfrm>
+      </p:grpSpPr>
       <p:sp>
         <p:nvSpPr>
           <p:cNvPr id="2" name="Título 1"/>
@@ -3530,12 +3897,12 @@
         <p:spPr/>
         <p:txBody>
           <a:bodyPr/>
+          <a:lstStyle/>
           <a:p>
             <a:r>
               <a:rPr lang="pt-BR" altLang="en-US"/>
               <a:t>PWM</a:t>
             </a:r>
-            <a:endParaRPr lang="pt-BR" altLang="en-US"/>
           </a:p>
         </p:txBody>
       </p:sp>
@@ -3552,30 +3919,43 @@
         <p:spPr/>
         <p:txBody>
           <a:bodyPr/>
+          <a:lstStyle/>
           <a:p>
             <a:pPr algn="just"/>
             <a:r>
               <a:rPr lang="pt-BR" altLang="en-US"/>
-              <a:t>A potência média é, portanto, a própria tensão média aplicada à carga é neste caso 50% da tensão de entrada.</a:t>
-            </a:r>
-            <a:endParaRPr lang="pt-BR" altLang="en-US"/>
-          </a:p>
-          <a:p>
-            <a:endParaRPr lang="pt-BR" altLang="en-US"/>
-          </a:p>
-          <a:p>
-            <a:pPr algn="just"/>
-            <a:r>
-              <a:rPr lang="pt-BR" altLang="en-US"/>
-              <a:t>O interruptor fechado pode definir uma largura de pulso pelo tempo em que ele fica nesta condição, e um intervalo entre pulsos pelo tempo em que ele fica aberto. Os dois tempos juntos definem o período e, portanto, uma frequência de controle.</a:t>
-            </a:r>
-            <a:endParaRPr lang="pt-BR" altLang="en-US"/>
-          </a:p>
-        </p:txBody>
-      </p:sp>
-      <p:sp>
-        <p:nvSpPr>
-          <p:cNvPr id="4" name="Espaço Reservado para Número de Slide 3"/>
+              <a:t>Uma idéia é fazermos com que a chave seja aberta e fechada rapidamente de modo que fique 50% do tempo aberta e 50% fechada. Isso significa que, em média, teremos metade do tempo com corrente e metade do tempo sem corrente.</a:t>
+            </a:r>
+          </a:p>
+        </p:txBody>
+      </p:sp>
+      <p:pic>
+        <p:nvPicPr>
+          <p:cNvPr id="4" name="Imagem 3" descr="mec0071a_04"/>
+          <p:cNvPicPr>
+            <a:picLocks noChangeAspect="1"/>
+          </p:cNvPicPr>
+          <p:nvPr/>
+        </p:nvPicPr>
+        <p:blipFill>
+          <a:blip r:embed="rId2"/>
+          <a:stretch>
+            <a:fillRect/>
+          </a:stretch>
+        </p:blipFill>
+        <p:spPr>
+          <a:xfrm>
+            <a:off x="838835" y="3585845"/>
+            <a:ext cx="10255250" cy="2946400"/>
+          </a:xfrm>
+          <a:prstGeom prst="rect">
+            <a:avLst/>
+          </a:prstGeom>
+        </p:spPr>
+      </p:pic>
+      <p:sp>
+        <p:nvSpPr>
+          <p:cNvPr id="5" name="Espaço Reservado para Número de Slide 4"/>
           <p:cNvSpPr>
             <a:spLocks noGrp="1"/>
           </p:cNvSpPr>
@@ -3586,9 +3966,11 @@
         <p:spPr/>
         <p:txBody>
           <a:bodyPr/>
+          <a:lstStyle/>
           <a:p>
             <a:fld id="{E3682030-28A4-485C-A222-4952DDFF562A}" type="slidenum">
               <a:rPr lang="pt-BR" smtClean="0"/>
+              <a:t>6</a:t>
             </a:fld>
             <a:endParaRPr lang="pt-BR"/>
           </a:p>
@@ -3611,7 +3993,14 @@
         <p:cNvGrpSpPr/>
         <p:nvPr/>
       </p:nvGrpSpPr>
-      <p:grpSpPr/>
+      <p:grpSpPr>
+        <a:xfrm>
+          <a:off x="0" y="0"/>
+          <a:ext cx="0" cy="0"/>
+          <a:chOff x="0" y="0"/>
+          <a:chExt cx="0" cy="0"/>
+        </a:xfrm>
+      </p:grpSpPr>
       <p:sp>
         <p:nvSpPr>
           <p:cNvPr id="2" name="Título 1"/>
@@ -3625,12 +4014,12 @@
         <p:spPr/>
         <p:txBody>
           <a:bodyPr/>
+          <a:lstStyle/>
           <a:p>
             <a:r>
               <a:rPr lang="pt-BR" altLang="en-US"/>
-              <a:t>PWM no Atmega8</a:t>
-            </a:r>
-            <a:endParaRPr lang="pt-BR" altLang="en-US"/>
+              <a:t>PWM</a:t>
+            </a:r>
           </a:p>
         </p:txBody>
       </p:sp>
@@ -3646,58 +4035,94 @@
         </p:nvSpPr>
         <p:spPr/>
         <p:txBody>
-          <a:bodyPr>
-            <a:normAutofit fontScale="90000"/>
-          </a:bodyPr>
+          <a:bodyPr/>
+          <a:lstStyle/>
           <a:p>
             <a:pPr algn="just"/>
             <a:r>
-              <a:rPr lang="pt-BR" altLang="en-US"/>
-              <a:t>Para o desenvolvimento deste trabalho estaremos utilizando o sinal PWM que está no pino PORTBO.</a:t>
-            </a:r>
-            <a:endParaRPr lang="pt-BR" altLang="en-US"/>
-          </a:p>
-          <a:p>
-            <a:pPr algn="just"/>
-            <a:r>
-              <a:rPr lang="pt-BR" altLang="en-US"/>
-              <a:t>O PWM de hardware pode ser programado configurando os registradores do temporizador. O ATMega8 tem três registradores de temporizador que você precisa definir para programar o</a:t>
-            </a:r>
-            <a:endParaRPr lang="pt-BR" altLang="en-US"/>
-          </a:p>
-          <a:p>
-            <a:pPr marL="0" indent="0" algn="just">
-              <a:buNone/>
-            </a:pPr>
-            <a:r>
-              <a:rPr lang="pt-BR" altLang="en-US"/>
-              <a:t>PWM:</a:t>
-            </a:r>
-            <a:endParaRPr lang="pt-BR" altLang="en-US"/>
-          </a:p>
-          <a:p>
-            <a:pPr algn="just"/>
-            <a:r>
-              <a:rPr lang="pt-BR" altLang="en-US"/>
-              <a:t>1.  O registrador TCCR1A deverá colocar o temporizador no modo PWM.</a:t>
-            </a:r>
-            <a:endParaRPr lang="pt-BR" altLang="en-US"/>
-          </a:p>
-          <a:p>
-            <a:pPr algn="just"/>
-            <a:r>
-              <a:rPr lang="pt-BR" altLang="en-US"/>
-              <a:t>2.  Os registradores TCNT1H e TCNT1Lsão usados para ajustar a freqüência de modulação</a:t>
-            </a:r>
-            <a:endParaRPr lang="pt-BR" altLang="en-US"/>
-          </a:p>
-          <a:p>
-            <a:pPr algn="just"/>
-            <a:r>
-              <a:rPr lang="pt-BR" altLang="en-US"/>
-              <a:t>3.  O registrador OCR1A é usado para ajustar o ciclo de trabalho.</a:t>
-            </a:r>
-            <a:endParaRPr lang="pt-BR" altLang="en-US"/>
+              <a:rPr lang="pt-BR" altLang="en-US" dirty="0"/>
+              <a:t>A potência média é, portanto, a própria tensão média aplicada à carga é neste caso 50% da tensão de entrada.</a:t>
+            </a:r>
+          </a:p>
+          <a:p>
+            <a:endParaRPr lang="pt-BR" altLang="en-US" dirty="0" smtClean="0"/>
+          </a:p>
+          <a:p>
+            <a:r>
+              <a:rPr lang="pt-BR" altLang="en-US" dirty="0" err="1" smtClean="0"/>
+              <a:t>Duty</a:t>
+            </a:r>
+            <a:r>
+              <a:rPr lang="pt-BR" altLang="en-US" dirty="0" smtClean="0"/>
+              <a:t> </a:t>
+            </a:r>
+            <a:r>
+              <a:rPr lang="pt-BR" altLang="en-US" dirty="0" err="1" smtClean="0"/>
+              <a:t>Cicle</a:t>
+            </a:r>
+            <a:r>
+              <a:rPr lang="pt-BR" altLang="en-US" dirty="0" smtClean="0"/>
+              <a:t> é o período de trabalho ou tempo ativo.</a:t>
+            </a:r>
+            <a:endParaRPr lang="pt-BR" altLang="en-US" dirty="0" smtClean="0"/>
+          </a:p>
+          <a:p>
+            <a:endParaRPr lang="pt-BR" altLang="en-US" dirty="0" smtClean="0"/>
+          </a:p>
+          <a:p>
+            <a:r>
+              <a:rPr lang="pt-BR" altLang="en-US" dirty="0" smtClean="0"/>
+              <a:t>O </a:t>
+            </a:r>
+            <a:r>
+              <a:rPr lang="pt-BR" altLang="en-US" dirty="0" err="1" smtClean="0"/>
+              <a:t>Dt</a:t>
+            </a:r>
+            <a:r>
+              <a:rPr lang="pt-BR" altLang="en-US" dirty="0" smtClean="0"/>
+              <a:t> (</a:t>
+            </a:r>
+            <a:r>
+              <a:rPr lang="pt-BR" altLang="en-US" dirty="0" err="1" smtClean="0"/>
+              <a:t>Duty</a:t>
+            </a:r>
+            <a:r>
+              <a:rPr lang="pt-BR" altLang="en-US" dirty="0" smtClean="0"/>
+              <a:t> </a:t>
+            </a:r>
+            <a:r>
+              <a:rPr lang="pt-BR" altLang="en-US" dirty="0" err="1" smtClean="0"/>
+              <a:t>Cicle</a:t>
+            </a:r>
+            <a:r>
+              <a:rPr lang="pt-BR" altLang="en-US" dirty="0" smtClean="0"/>
+              <a:t>) = </a:t>
+            </a:r>
+            <a:r>
+              <a:rPr lang="pt-BR" altLang="en-US" dirty="0" err="1" smtClean="0"/>
+              <a:t>Ton</a:t>
+            </a:r>
+            <a:r>
+              <a:rPr lang="pt-BR" altLang="en-US" dirty="0" smtClean="0"/>
+              <a:t> / </a:t>
+            </a:r>
+            <a:r>
+              <a:rPr lang="pt-BR" altLang="en-US" dirty="0" err="1" smtClean="0"/>
+              <a:t>Ton</a:t>
+            </a:r>
+            <a:r>
+              <a:rPr lang="pt-BR" altLang="en-US" dirty="0" smtClean="0"/>
+              <a:t> + </a:t>
+            </a:r>
+            <a:r>
+              <a:rPr lang="pt-BR" altLang="en-US" dirty="0" err="1" smtClean="0"/>
+              <a:t>Toff</a:t>
+            </a:r>
+            <a:r>
+              <a:rPr lang="pt-BR" altLang="en-US" dirty="0" smtClean="0"/>
+              <a:t> .</a:t>
+            </a:r>
+            <a:endParaRPr lang="pt-BR" altLang="en-US" dirty="0"/>
           </a:p>
         </p:txBody>
       </p:sp>
@@ -3714,9 +4139,11 @@
         <p:spPr/>
         <p:txBody>
           <a:bodyPr/>
+          <a:lstStyle/>
           <a:p>
             <a:fld id="{E3682030-28A4-485C-A222-4952DDFF562A}" type="slidenum">
               <a:rPr lang="pt-BR" smtClean="0"/>
+              <a:t>7</a:t>
             </a:fld>
             <a:endParaRPr lang="pt-BR"/>
           </a:p>
@@ -3739,7 +4166,14 @@
         <p:cNvGrpSpPr/>
         <p:nvPr/>
       </p:nvGrpSpPr>
-      <p:grpSpPr/>
+      <p:grpSpPr>
+        <a:xfrm>
+          <a:off x="0" y="0"/>
+          <a:ext cx="0" cy="0"/>
+          <a:chOff x="0" y="0"/>
+          <a:chExt cx="0" cy="0"/>
+        </a:xfrm>
+      </p:grpSpPr>
       <p:sp>
         <p:nvSpPr>
           <p:cNvPr id="2" name="Título 1"/>
@@ -3753,44 +4187,107 @@
         <p:spPr/>
         <p:txBody>
           <a:bodyPr/>
+          <a:lstStyle/>
           <a:p>
             <a:r>
               <a:rPr lang="pt-BR" altLang="en-US"/>
-              <a:t>Montagem protoboard: PWM </a:t>
-            </a:r>
-            <a:endParaRPr lang="pt-BR" altLang="en-US"/>
-          </a:p>
-        </p:txBody>
-      </p:sp>
-      <p:pic>
-        <p:nvPicPr>
-          <p:cNvPr id="4" name="Espaço Reservado para Conteúdo 3" descr="Fading_LED_Fritzing_bb"/>
-          <p:cNvPicPr>
-            <a:picLocks noChangeAspect="1"/>
-          </p:cNvPicPr>
+              <a:t>PWM no Atmega8</a:t>
+            </a:r>
+          </a:p>
+        </p:txBody>
+      </p:sp>
+      <p:sp>
+        <p:nvSpPr>
+          <p:cNvPr id="3" name="Espaço Reservado para Conteúdo 2"/>
+          <p:cNvSpPr>
+            <a:spLocks noGrp="1"/>
+          </p:cNvSpPr>
           <p:nvPr>
             <p:ph idx="1"/>
           </p:nvPr>
-        </p:nvPicPr>
-        <p:blipFill>
-          <a:blip r:embed="rId1"/>
-          <a:stretch>
-            <a:fillRect/>
-          </a:stretch>
-        </p:blipFill>
-        <p:spPr>
-          <a:xfrm>
-            <a:off x="1534160" y="1979930"/>
-            <a:ext cx="9124315" cy="3764280"/>
-          </a:xfrm>
-          <a:prstGeom prst="rect">
-            <a:avLst/>
-          </a:prstGeom>
-        </p:spPr>
-      </p:pic>
-      <p:sp>
-        <p:nvSpPr>
-          <p:cNvPr id="3" name="Espaço Reservado para Número de Slide 2"/>
+        </p:nvSpPr>
+        <p:spPr/>
+        <p:txBody>
+          <a:bodyPr>
+            <a:normAutofit fontScale="97500"/>
+          </a:bodyPr>
+          <a:lstStyle/>
+          <a:p>
+            <a:pPr algn="just"/>
+            <a:r>
+              <a:rPr lang="pt-BR" altLang="en-US" dirty="0"/>
+              <a:t>Para o desenvolvimento deste trabalho estaremos utilizando o sinal PWM que está no pino </a:t>
+            </a:r>
+            <a:r>
+              <a:rPr lang="pt-BR" altLang="en-US" dirty="0" smtClean="0"/>
+              <a:t>PORTB1.</a:t>
+            </a:r>
+            <a:endParaRPr lang="pt-BR" altLang="en-US" dirty="0"/>
+          </a:p>
+          <a:p>
+            <a:pPr algn="just"/>
+            <a:r>
+              <a:rPr lang="pt-BR" altLang="en-US" dirty="0"/>
+              <a:t>O PWM de hardware pode ser programado configurando os registradores do temporizador. O ATMega8 tem três registradores de temporizador que você precisa definir para programar o</a:t>
+            </a:r>
+          </a:p>
+          <a:p>
+            <a:pPr marL="0" indent="0" algn="just">
+              <a:buNone/>
+            </a:pPr>
+            <a:r>
+              <a:rPr lang="pt-BR" altLang="en-US" dirty="0"/>
+              <a:t>PWM:</a:t>
+            </a:r>
+          </a:p>
+          <a:p>
+            <a:pPr algn="just"/>
+            <a:r>
+              <a:rPr lang="pt-BR" altLang="en-US" dirty="0" smtClean="0"/>
+              <a:t>Os </a:t>
+            </a:r>
+            <a:r>
+              <a:rPr lang="pt-BR" altLang="en-US" dirty="0"/>
+              <a:t>registradores </a:t>
+            </a:r>
+            <a:r>
+              <a:rPr lang="pt-BR" altLang="en-US" dirty="0" smtClean="0"/>
+              <a:t>TCCR1B é usados </a:t>
+            </a:r>
+            <a:r>
+              <a:rPr lang="pt-BR" altLang="en-US" dirty="0"/>
+              <a:t>para ajustar a </a:t>
+            </a:r>
+            <a:r>
+              <a:rPr lang="pt-BR" altLang="en-US" dirty="0" smtClean="0"/>
+              <a:t>frequência </a:t>
+            </a:r>
+            <a:r>
+              <a:rPr lang="pt-BR" altLang="en-US" dirty="0"/>
+              <a:t>de </a:t>
+            </a:r>
+            <a:r>
+              <a:rPr lang="pt-BR" altLang="en-US" dirty="0" smtClean="0"/>
+              <a:t>modulação.</a:t>
+            </a:r>
+            <a:endParaRPr lang="pt-BR" altLang="en-US" dirty="0"/>
+          </a:p>
+          <a:p>
+            <a:pPr algn="just"/>
+            <a:r>
+              <a:rPr lang="pt-BR" altLang="en-US" dirty="0" smtClean="0"/>
+              <a:t>O </a:t>
+            </a:r>
+            <a:r>
+              <a:rPr lang="pt-BR" altLang="en-US" dirty="0"/>
+              <a:t>registrador OCR1A é usado para ajustar o ciclo de trabalho.</a:t>
+            </a:r>
+          </a:p>
+        </p:txBody>
+      </p:sp>
+      <p:sp>
+        <p:nvSpPr>
+          <p:cNvPr id="4" name="Espaço Reservado para Número de Slide 3"/>
           <p:cNvSpPr>
             <a:spLocks noGrp="1"/>
           </p:cNvSpPr>
@@ -3801,9 +4298,11 @@
         <p:spPr/>
         <p:txBody>
           <a:bodyPr/>
+          <a:lstStyle/>
           <a:p>
             <a:fld id="{E3682030-28A4-485C-A222-4952DDFF562A}" type="slidenum">
               <a:rPr lang="pt-BR" smtClean="0"/>
+              <a:t>8</a:t>
             </a:fld>
             <a:endParaRPr lang="pt-BR"/>
           </a:p>
@@ -3814,6 +4313,13 @@
   <p:clrMapOvr>
     <a:masterClrMapping/>
   </p:clrMapOvr>
+  <p:timing>
+    <p:tnLst>
+      <p:par>
+        <p:cTn id="1" dur="indefinite" restart="never" nodeType="tmRoot"/>
+      </p:par>
+    </p:tnLst>
+  </p:timing>
 </p:sld>
 </file>
 
@@ -3826,7 +4332,14 @@
         <p:cNvGrpSpPr/>
         <p:nvPr/>
       </p:nvGrpSpPr>
-      <p:grpSpPr/>
+      <p:grpSpPr>
+        <a:xfrm>
+          <a:off x="0" y="0"/>
+          <a:ext cx="0" cy="0"/>
+          <a:chOff x="0" y="0"/>
+          <a:chExt cx="0" cy="0"/>
+        </a:xfrm>
+      </p:grpSpPr>
       <p:sp>
         <p:nvSpPr>
           <p:cNvPr id="2" name="Título 1"/>
@@ -3840,67 +4353,121 @@
         <p:spPr/>
         <p:txBody>
           <a:bodyPr/>
-          <a:p>
-            <a:r>
-              <a:rPr lang="pt-BR" altLang="en-US"/>
-              <a:t>Esquemático: Projeto PWM</a:t>
-            </a:r>
-            <a:endParaRPr lang="pt-BR" altLang="en-US"/>
+          <a:lstStyle/>
+          <a:p>
+            <a:r>
+              <a:rPr lang="pt-BR" dirty="0" smtClean="0"/>
+              <a:t>Registradores: TCCR1A</a:t>
+            </a:r>
+            <a:endParaRPr lang="pt-BR" dirty="0"/>
+          </a:p>
+        </p:txBody>
+      </p:sp>
+      <p:sp>
+        <p:nvSpPr>
+          <p:cNvPr id="3" name="Espaço Reservado para Conteúdo 2"/>
+          <p:cNvSpPr>
+            <a:spLocks noGrp="1"/>
+          </p:cNvSpPr>
+          <p:nvPr>
+            <p:ph idx="1"/>
+          </p:nvPr>
+        </p:nvSpPr>
+        <p:spPr/>
+        <p:txBody>
+          <a:bodyPr/>
+          <a:lstStyle/>
+          <a:p>
+            <a:r>
+              <a:rPr lang="pt-BR" altLang="en-US" dirty="0" smtClean="0"/>
+              <a:t>É um registrador usado para definir o modo do temporizador.</a:t>
+            </a:r>
+          </a:p>
+          <a:p>
+            <a:pPr marL="0" indent="0">
+              <a:buNone/>
+            </a:pPr>
+            <a:endParaRPr lang="pt-BR" altLang="en-US" dirty="0" smtClean="0"/>
+          </a:p>
+          <a:p>
+            <a:r>
+              <a:rPr lang="pt-BR" altLang="en-US" dirty="0" smtClean="0"/>
+              <a:t>O </a:t>
+            </a:r>
+            <a:r>
+              <a:rPr lang="pt-BR" altLang="en-US" dirty="0"/>
+              <a:t>registrador TCCR1A deverá colocar o temporizador no modo PWM.</a:t>
+            </a:r>
+          </a:p>
+          <a:p>
+            <a:endParaRPr lang="pt-BR" dirty="0"/>
+          </a:p>
+        </p:txBody>
+      </p:sp>
+      <p:sp>
+        <p:nvSpPr>
+          <p:cNvPr id="4" name="Espaço Reservado para Número de Slide 3"/>
+          <p:cNvSpPr>
+            <a:spLocks noGrp="1"/>
+          </p:cNvSpPr>
+          <p:nvPr>
+            <p:ph type="sldNum" sz="quarter" idx="12"/>
+          </p:nvPr>
+        </p:nvSpPr>
+        <p:spPr/>
+        <p:txBody>
+          <a:bodyPr/>
+          <a:lstStyle/>
+          <a:p>
+            <a:fld id="{E3682030-28A4-485C-A222-4952DDFF562A}" type="slidenum">
+              <a:rPr lang="pt-BR" smtClean="0"/>
+              <a:t>9</a:t>
+            </a:fld>
+            <a:endParaRPr lang="pt-BR"/>
           </a:p>
         </p:txBody>
       </p:sp>
       <p:pic>
         <p:nvPicPr>
-          <p:cNvPr id="5" name="Espaço Reservado para Conteúdo 4" descr="Fading_LED_Fritzing_Esquemático"/>
+          <p:cNvPr id="5" name="Imagem 4"/>
           <p:cNvPicPr>
             <a:picLocks noChangeAspect="1"/>
           </p:cNvPicPr>
-          <p:nvPr>
-            <p:ph idx="1"/>
-          </p:nvPr>
+          <p:nvPr/>
         </p:nvPicPr>
         <p:blipFill>
-          <a:blip r:embed="rId1"/>
+          <a:blip r:embed="rId2"/>
           <a:stretch>
             <a:fillRect/>
           </a:stretch>
         </p:blipFill>
         <p:spPr>
           <a:xfrm>
-            <a:off x="1143635" y="1239520"/>
-            <a:ext cx="9242425" cy="5601335"/>
+            <a:off x="408143" y="4302484"/>
+            <a:ext cx="11452987" cy="1587019"/>
           </a:xfrm>
           <a:prstGeom prst="rect">
             <a:avLst/>
           </a:prstGeom>
         </p:spPr>
       </p:pic>
-      <p:sp>
-        <p:nvSpPr>
-          <p:cNvPr id="3" name="Espaço Reservado para Número de Slide 2"/>
-          <p:cNvSpPr>
-            <a:spLocks noGrp="1"/>
-          </p:cNvSpPr>
-          <p:nvPr>
-            <p:ph type="sldNum" sz="quarter" idx="12"/>
-          </p:nvPr>
-        </p:nvSpPr>
-        <p:spPr/>
-        <p:txBody>
-          <a:bodyPr/>
-          <a:p>
-            <a:fld id="{E3682030-28A4-485C-A222-4952DDFF562A}" type="slidenum">
-              <a:rPr lang="pt-BR" smtClean="0"/>
-            </a:fld>
-            <a:endParaRPr lang="pt-BR"/>
-          </a:p>
-        </p:txBody>
-      </p:sp>
     </p:spTree>
+    <p:extLst>
+      <p:ext uri="{BB962C8B-B14F-4D97-AF65-F5344CB8AC3E}">
+        <p14:creationId xmlns:p14="http://schemas.microsoft.com/office/powerpoint/2010/main" val="2799562561"/>
+      </p:ext>
+    </p:extLst>
   </p:cSld>
   <p:clrMapOvr>
     <a:masterClrMapping/>
   </p:clrMapOvr>
+  <p:timing>
+    <p:tnLst>
+      <p:par>
+        <p:cTn id="1" dur="indefinite" restart="never" nodeType="tmRoot"/>
+      </p:par>
+    </p:tnLst>
+  </p:timing>
 </p:sld>
 </file>
 
@@ -4155,6 +4722,8 @@
       </a:bgFillStyleLst>
     </a:fmtScheme>
   </a:themeElements>
+  <a:objectDefaults/>
+  <a:extraClrSchemeLst/>
   <a:extLst>
     <a:ext uri="{05A4C25C-085E-4340-85A3-A5531E510DB2}">
       <thm15:themeFamily xmlns:thm15="http://schemas.microsoft.com/office/thememl/2012/main" name="Office Theme" id="{62F939B6-93AF-4DB8-9C6B-D6C7DFDC589F}" vid="{4A3C46E8-61CC-4603-A589-7422A47A8E4A}"/>
@@ -4414,6 +4983,8 @@
       </a:bgFillStyleLst>
     </a:fmtScheme>
   </a:themeElements>
+  <a:objectDefaults/>
+  <a:extraClrSchemeLst/>
   <a:extLst>
     <a:ext uri="{05A4C25C-085E-4340-85A3-A5531E510DB2}">
       <thm15:themeFamily xmlns:thm15="http://schemas.microsoft.com/office/thememl/2012/main" name="Office Theme" id="{62F939B6-93AF-4DB8-9C6B-D6C7DFDC589F}" vid="{4A3C46E8-61CC-4603-A589-7422A47A8E4A}"/>

</xml_diff>